<commit_message>
Web Scrapping part 1
</commit_message>
<xml_diff>
--- a/CSDA_5310_Individual_Project_Anjesh_Sahani.pptx
+++ b/CSDA_5310_Individual_Project_Anjesh_Sahani.pptx
@@ -2,7 +2,7 @@
 <file path=ppt/presentation.xml><?xml version="1.0" encoding="utf-8"?>
 <p:presentation xmlns:a="http://schemas.openxmlformats.org/drawingml/2006/main" xmlns:r="http://schemas.openxmlformats.org/officeDocument/2006/relationships" xmlns:p="http://schemas.openxmlformats.org/presentationml/2006/main" autoCompressPictures="0">
   <p:sldMasterIdLst>
-    <p:sldMasterId id="2147483732" r:id="rId1"/>
+    <p:sldMasterId id="2147483768" r:id="rId1"/>
   </p:sldMasterIdLst>
   <p:sldIdLst>
     <p:sldId id="256" r:id="rId2"/>
@@ -10,8 +10,9 @@
     <p:sldId id="258" r:id="rId4"/>
     <p:sldId id="259" r:id="rId5"/>
     <p:sldId id="262" r:id="rId6"/>
-    <p:sldId id="263" r:id="rId7"/>
-    <p:sldId id="265" r:id="rId8"/>
+    <p:sldId id="266" r:id="rId7"/>
+    <p:sldId id="263" r:id="rId8"/>
+    <p:sldId id="265" r:id="rId9"/>
   </p:sldIdLst>
   <p:sldSz cx="12192000" cy="6858000"/>
   <p:notesSz cx="6858000" cy="9144000"/>
@@ -304,7 +305,7 @@
           <a:p>
             <a:fld id="{A423BF71-38B7-8642-BFCE-EDAE9BD0CBAF}" type="datetimeFigureOut">
               <a:rPr lang="en-US" smtClean="0"/>
-              <a:t>10/10/2024</a:t>
+              <a:t>10/13/2024</a:t>
             </a:fld>
             <a:endParaRPr lang="en-US" dirty="0"/>
           </a:p>
@@ -355,7 +356,7 @@
     </p:spTree>
     <p:extLst>
       <p:ext uri="{BB962C8B-B14F-4D97-AF65-F5344CB8AC3E}">
-        <p14:creationId xmlns:p14="http://schemas.microsoft.com/office/powerpoint/2010/main" val="512338591"/>
+        <p14:creationId xmlns:p14="http://schemas.microsoft.com/office/powerpoint/2010/main" val="3694448369"/>
       </p:ext>
     </p:extLst>
   </p:cSld>
@@ -579,7 +580,7 @@
           <a:p>
             <a:fld id="{4CD8A92E-5FF9-8143-81B3-CCB531513398}" type="datetimeFigureOut">
               <a:rPr lang="en-US" smtClean="0"/>
-              <a:t>10/10/2024</a:t>
+              <a:t>10/13/2024</a:t>
             </a:fld>
             <a:endParaRPr lang="en-US" dirty="0"/>
           </a:p>
@@ -631,7 +632,7 @@
     </p:spTree>
     <p:extLst>
       <p:ext uri="{BB962C8B-B14F-4D97-AF65-F5344CB8AC3E}">
-        <p14:creationId xmlns:p14="http://schemas.microsoft.com/office/powerpoint/2010/main" val="3221317442"/>
+        <p14:creationId xmlns:p14="http://schemas.microsoft.com/office/powerpoint/2010/main" val="882818214"/>
       </p:ext>
     </p:extLst>
   </p:cSld>
@@ -775,7 +776,7 @@
           <a:p>
             <a:fld id="{4CD8A92E-5FF9-8143-81B3-CCB531513398}" type="datetimeFigureOut">
               <a:rPr lang="en-US" smtClean="0"/>
-              <a:t>10/10/2024</a:t>
+              <a:t>10/13/2024</a:t>
             </a:fld>
             <a:endParaRPr lang="en-US" dirty="0"/>
           </a:p>
@@ -827,7 +828,7 @@
     </p:spTree>
     <p:extLst>
       <p:ext uri="{BB962C8B-B14F-4D97-AF65-F5344CB8AC3E}">
-        <p14:creationId xmlns:p14="http://schemas.microsoft.com/office/powerpoint/2010/main" val="1868925525"/>
+        <p14:creationId xmlns:p14="http://schemas.microsoft.com/office/powerpoint/2010/main" val="4195900330"/>
       </p:ext>
     </p:extLst>
   </p:cSld>
@@ -1050,7 +1051,7 @@
           <a:p>
             <a:fld id="{4CD8A92E-5FF9-8143-81B3-CCB531513398}" type="datetimeFigureOut">
               <a:rPr lang="en-US" smtClean="0"/>
-              <a:t>10/10/2024</a:t>
+              <a:t>10/13/2024</a:t>
             </a:fld>
             <a:endParaRPr lang="en-US" dirty="0"/>
           </a:p>
@@ -1196,7 +1197,7 @@
     </p:spTree>
     <p:extLst>
       <p:ext uri="{BB962C8B-B14F-4D97-AF65-F5344CB8AC3E}">
-        <p14:creationId xmlns:p14="http://schemas.microsoft.com/office/powerpoint/2010/main" val="3398151451"/>
+        <p14:creationId xmlns:p14="http://schemas.microsoft.com/office/powerpoint/2010/main" val="4204940166"/>
       </p:ext>
     </p:extLst>
   </p:cSld>
@@ -1393,7 +1394,7 @@
           <a:p>
             <a:fld id="{4CD8A92E-5FF9-8143-81B3-CCB531513398}" type="datetimeFigureOut">
               <a:rPr lang="en-US" smtClean="0"/>
-              <a:t>10/10/2024</a:t>
+              <a:t>10/13/2024</a:t>
             </a:fld>
             <a:endParaRPr lang="en-US" dirty="0"/>
           </a:p>
@@ -1445,7 +1446,7 @@
     </p:spTree>
     <p:extLst>
       <p:ext uri="{BB962C8B-B14F-4D97-AF65-F5344CB8AC3E}">
-        <p14:creationId xmlns:p14="http://schemas.microsoft.com/office/powerpoint/2010/main" val="3325926584"/>
+        <p14:creationId xmlns:p14="http://schemas.microsoft.com/office/powerpoint/2010/main" val="1141512580"/>
       </p:ext>
     </p:extLst>
   </p:cSld>
@@ -2018,7 +2019,7 @@
           <a:p>
             <a:fld id="{4CD8A92E-5FF9-8143-81B3-CCB531513398}" type="datetimeFigureOut">
               <a:rPr lang="en-US" smtClean="0"/>
-              <a:t>10/10/2024</a:t>
+              <a:t>10/13/2024</a:t>
             </a:fld>
             <a:endParaRPr lang="en-US" dirty="0"/>
           </a:p>
@@ -2070,7 +2071,7 @@
     </p:spTree>
     <p:extLst>
       <p:ext uri="{BB962C8B-B14F-4D97-AF65-F5344CB8AC3E}">
-        <p14:creationId xmlns:p14="http://schemas.microsoft.com/office/powerpoint/2010/main" val="234040016"/>
+        <p14:creationId xmlns:p14="http://schemas.microsoft.com/office/powerpoint/2010/main" val="654666467"/>
       </p:ext>
     </p:extLst>
   </p:cSld>
@@ -2880,7 +2881,7 @@
           <a:p>
             <a:fld id="{4CD8A92E-5FF9-8143-81B3-CCB531513398}" type="datetimeFigureOut">
               <a:rPr lang="en-US" smtClean="0"/>
-              <a:t>10/10/2024</a:t>
+              <a:t>10/13/2024</a:t>
             </a:fld>
             <a:endParaRPr lang="en-US" dirty="0"/>
           </a:p>
@@ -2932,7 +2933,7 @@
     </p:spTree>
     <p:extLst>
       <p:ext uri="{BB962C8B-B14F-4D97-AF65-F5344CB8AC3E}">
-        <p14:creationId xmlns:p14="http://schemas.microsoft.com/office/powerpoint/2010/main" val="2266684739"/>
+        <p14:creationId xmlns:p14="http://schemas.microsoft.com/office/powerpoint/2010/main" val="2466012423"/>
       </p:ext>
     </p:extLst>
   </p:cSld>
@@ -3052,7 +3053,7 @@
           <a:p>
             <a:fld id="{73B025CB-9D18-264E-A945-2D020344C9DA}" type="datetimeFigureOut">
               <a:rPr lang="en-US" smtClean="0"/>
-              <a:t>10/10/2024</a:t>
+              <a:t>10/13/2024</a:t>
             </a:fld>
             <a:endParaRPr lang="en-US" dirty="0"/>
           </a:p>
@@ -3103,7 +3104,7 @@
     </p:spTree>
     <p:extLst>
       <p:ext uri="{BB962C8B-B14F-4D97-AF65-F5344CB8AC3E}">
-        <p14:creationId xmlns:p14="http://schemas.microsoft.com/office/powerpoint/2010/main" val="964287502"/>
+        <p14:creationId xmlns:p14="http://schemas.microsoft.com/office/powerpoint/2010/main" val="894781040"/>
       </p:ext>
     </p:extLst>
   </p:cSld>
@@ -3232,7 +3233,7 @@
           <a:p>
             <a:fld id="{507EFB6C-7E96-8F41-8872-189CA1C59F84}" type="datetimeFigureOut">
               <a:rPr lang="en-US" smtClean="0"/>
-              <a:t>10/10/2024</a:t>
+              <a:t>10/13/2024</a:t>
             </a:fld>
             <a:endParaRPr lang="en-US" dirty="0"/>
           </a:p>
@@ -3283,7 +3284,7 @@
     </p:spTree>
     <p:extLst>
       <p:ext uri="{BB962C8B-B14F-4D97-AF65-F5344CB8AC3E}">
-        <p14:creationId xmlns:p14="http://schemas.microsoft.com/office/powerpoint/2010/main" val="3128728262"/>
+        <p14:creationId xmlns:p14="http://schemas.microsoft.com/office/powerpoint/2010/main" val="723257956"/>
       </p:ext>
     </p:extLst>
   </p:cSld>
@@ -3402,7 +3403,7 @@
           <a:p>
             <a:fld id="{B6981CDE-9BE7-C544-8ACB-7077DFC4270F}" type="datetimeFigureOut">
               <a:rPr lang="en-US" smtClean="0"/>
-              <a:t>10/10/2024</a:t>
+              <a:t>10/13/2024</a:t>
             </a:fld>
             <a:endParaRPr lang="en-US" dirty="0"/>
           </a:p>
@@ -3453,7 +3454,7 @@
     </p:spTree>
     <p:extLst>
       <p:ext uri="{BB962C8B-B14F-4D97-AF65-F5344CB8AC3E}">
-        <p14:creationId xmlns:p14="http://schemas.microsoft.com/office/powerpoint/2010/main" val="2785246037"/>
+        <p14:creationId xmlns:p14="http://schemas.microsoft.com/office/powerpoint/2010/main" val="2301660148"/>
       </p:ext>
     </p:extLst>
   </p:cSld>
@@ -3649,7 +3650,7 @@
           <a:p>
             <a:fld id="{B55BA285-9698-1B45-8319-D90A8C63F150}" type="datetimeFigureOut">
               <a:rPr lang="en-US" smtClean="0"/>
-              <a:t>10/10/2024</a:t>
+              <a:t>10/13/2024</a:t>
             </a:fld>
             <a:endParaRPr lang="en-US" dirty="0"/>
           </a:p>
@@ -3700,7 +3701,7 @@
     </p:spTree>
     <p:extLst>
       <p:ext uri="{BB962C8B-B14F-4D97-AF65-F5344CB8AC3E}">
-        <p14:creationId xmlns:p14="http://schemas.microsoft.com/office/powerpoint/2010/main" val="1249407780"/>
+        <p14:creationId xmlns:p14="http://schemas.microsoft.com/office/powerpoint/2010/main" val="3198626089"/>
       </p:ext>
     </p:extLst>
   </p:cSld>
@@ -3941,7 +3942,7 @@
           <a:p>
             <a:fld id="{0A86CD42-43FF-B740-998F-DCC3802C4CE3}" type="datetimeFigureOut">
               <a:rPr lang="en-US" smtClean="0"/>
-              <a:t>10/10/2024</a:t>
+              <a:t>10/13/2024</a:t>
             </a:fld>
             <a:endParaRPr lang="en-US" dirty="0"/>
           </a:p>
@@ -3992,7 +3993,7 @@
     </p:spTree>
     <p:extLst>
       <p:ext uri="{BB962C8B-B14F-4D97-AF65-F5344CB8AC3E}">
-        <p14:creationId xmlns:p14="http://schemas.microsoft.com/office/powerpoint/2010/main" val="2378893806"/>
+        <p14:creationId xmlns:p14="http://schemas.microsoft.com/office/powerpoint/2010/main" val="3814860241"/>
       </p:ext>
     </p:extLst>
   </p:cSld>
@@ -4385,7 +4386,7 @@
           <a:p>
             <a:fld id="{CEA0FFBD-2EE4-8547-BBAE-A1AC91C8D77E}" type="datetimeFigureOut">
               <a:rPr lang="en-US" smtClean="0"/>
-              <a:t>10/10/2024</a:t>
+              <a:t>10/13/2024</a:t>
             </a:fld>
             <a:endParaRPr lang="en-US" dirty="0"/>
           </a:p>
@@ -4436,7 +4437,7 @@
     </p:spTree>
     <p:extLst>
       <p:ext uri="{BB962C8B-B14F-4D97-AF65-F5344CB8AC3E}">
-        <p14:creationId xmlns:p14="http://schemas.microsoft.com/office/powerpoint/2010/main" val="3800106518"/>
+        <p14:creationId xmlns:p14="http://schemas.microsoft.com/office/powerpoint/2010/main" val="826059930"/>
       </p:ext>
     </p:extLst>
   </p:cSld>
@@ -4503,7 +4504,7 @@
           <a:p>
             <a:fld id="{955A2352-D7AC-F242-9256-A4477BCBF354}" type="datetimeFigureOut">
               <a:rPr lang="en-US" smtClean="0"/>
-              <a:t>10/10/2024</a:t>
+              <a:t>10/13/2024</a:t>
             </a:fld>
             <a:endParaRPr lang="en-US" dirty="0"/>
           </a:p>
@@ -4554,7 +4555,7 @@
     </p:spTree>
     <p:extLst>
       <p:ext uri="{BB962C8B-B14F-4D97-AF65-F5344CB8AC3E}">
-        <p14:creationId xmlns:p14="http://schemas.microsoft.com/office/powerpoint/2010/main" val="1094368416"/>
+        <p14:creationId xmlns:p14="http://schemas.microsoft.com/office/powerpoint/2010/main" val="4256657385"/>
       </p:ext>
     </p:extLst>
   </p:cSld>
@@ -4598,7 +4599,7 @@
           <a:p>
             <a:fld id="{4EFCFC6A-9AE6-404D-9FDD-168B477B9C90}" type="datetimeFigureOut">
               <a:rPr lang="en-US" smtClean="0"/>
-              <a:t>10/10/2024</a:t>
+              <a:t>10/13/2024</a:t>
             </a:fld>
             <a:endParaRPr lang="en-US" dirty="0"/>
           </a:p>
@@ -4649,7 +4650,7 @@
     </p:spTree>
     <p:extLst>
       <p:ext uri="{BB962C8B-B14F-4D97-AF65-F5344CB8AC3E}">
-        <p14:creationId xmlns:p14="http://schemas.microsoft.com/office/powerpoint/2010/main" val="1472458312"/>
+        <p14:creationId xmlns:p14="http://schemas.microsoft.com/office/powerpoint/2010/main" val="4155698533"/>
       </p:ext>
     </p:extLst>
   </p:cSld>
@@ -4877,7 +4878,7 @@
           <a:p>
             <a:fld id="{61CFCDFD-B4CF-A241-8D71-E814B10BEAF4}" type="datetimeFigureOut">
               <a:rPr lang="en-US" smtClean="0"/>
-              <a:t>10/10/2024</a:t>
+              <a:t>10/13/2024</a:t>
             </a:fld>
             <a:endParaRPr lang="en-US" dirty="0"/>
           </a:p>
@@ -4928,7 +4929,7 @@
     </p:spTree>
     <p:extLst>
       <p:ext uri="{BB962C8B-B14F-4D97-AF65-F5344CB8AC3E}">
-        <p14:creationId xmlns:p14="http://schemas.microsoft.com/office/powerpoint/2010/main" val="1424970576"/>
+        <p14:creationId xmlns:p14="http://schemas.microsoft.com/office/powerpoint/2010/main" val="651282087"/>
       </p:ext>
     </p:extLst>
   </p:cSld>
@@ -5152,7 +5153,7 @@
           <a:p>
             <a:fld id="{26A7B589-FD4B-7E46-869A-CBADC5FC564E}" type="datetimeFigureOut">
               <a:rPr lang="en-US" smtClean="0"/>
-              <a:t>10/10/2024</a:t>
+              <a:t>10/13/2024</a:t>
             </a:fld>
             <a:endParaRPr lang="en-US" dirty="0"/>
           </a:p>
@@ -5203,7 +5204,7 @@
     </p:spTree>
     <p:extLst>
       <p:ext uri="{BB962C8B-B14F-4D97-AF65-F5344CB8AC3E}">
-        <p14:creationId xmlns:p14="http://schemas.microsoft.com/office/powerpoint/2010/main" val="501666085"/>
+        <p14:creationId xmlns:p14="http://schemas.microsoft.com/office/powerpoint/2010/main" val="1856509821"/>
       </p:ext>
     </p:extLst>
   </p:cSld>
@@ -5581,7 +5582,7 @@
           <a:p>
             <a:fld id="{4CD8A92E-5FF9-8143-81B3-CCB531513398}" type="datetimeFigureOut">
               <a:rPr lang="en-US" smtClean="0"/>
-              <a:t>10/10/2024</a:t>
+              <a:t>10/13/2024</a:t>
             </a:fld>
             <a:endParaRPr lang="en-US" dirty="0"/>
           </a:p>
@@ -5670,29 +5671,29 @@
     </p:spTree>
     <p:extLst>
       <p:ext uri="{BB962C8B-B14F-4D97-AF65-F5344CB8AC3E}">
-        <p14:creationId xmlns:p14="http://schemas.microsoft.com/office/powerpoint/2010/main" val="1462432971"/>
+        <p14:creationId xmlns:p14="http://schemas.microsoft.com/office/powerpoint/2010/main" val="2879294665"/>
       </p:ext>
     </p:extLst>
   </p:cSld>
   <p:clrMap bg1="dk1" tx1="lt1" bg2="dk2" tx2="lt2" accent1="accent1" accent2="accent2" accent3="accent3" accent4="accent4" accent5="accent5" accent6="accent6" hlink="hlink" folHlink="folHlink"/>
   <p:sldLayoutIdLst>
-    <p:sldLayoutId id="2147483733" r:id="rId1"/>
-    <p:sldLayoutId id="2147483734" r:id="rId2"/>
-    <p:sldLayoutId id="2147483735" r:id="rId3"/>
-    <p:sldLayoutId id="2147483736" r:id="rId4"/>
-    <p:sldLayoutId id="2147483737" r:id="rId5"/>
-    <p:sldLayoutId id="2147483738" r:id="rId6"/>
-    <p:sldLayoutId id="2147483739" r:id="rId7"/>
-    <p:sldLayoutId id="2147483740" r:id="rId8"/>
-    <p:sldLayoutId id="2147483741" r:id="rId9"/>
-    <p:sldLayoutId id="2147483742" r:id="rId10"/>
-    <p:sldLayoutId id="2147483743" r:id="rId11"/>
-    <p:sldLayoutId id="2147483744" r:id="rId12"/>
-    <p:sldLayoutId id="2147483745" r:id="rId13"/>
-    <p:sldLayoutId id="2147483746" r:id="rId14"/>
-    <p:sldLayoutId id="2147483747" r:id="rId15"/>
-    <p:sldLayoutId id="2147483748" r:id="rId16"/>
-    <p:sldLayoutId id="2147483749" r:id="rId17"/>
+    <p:sldLayoutId id="2147483769" r:id="rId1"/>
+    <p:sldLayoutId id="2147483770" r:id="rId2"/>
+    <p:sldLayoutId id="2147483771" r:id="rId3"/>
+    <p:sldLayoutId id="2147483772" r:id="rId4"/>
+    <p:sldLayoutId id="2147483773" r:id="rId5"/>
+    <p:sldLayoutId id="2147483774" r:id="rId6"/>
+    <p:sldLayoutId id="2147483775" r:id="rId7"/>
+    <p:sldLayoutId id="2147483776" r:id="rId8"/>
+    <p:sldLayoutId id="2147483777" r:id="rId9"/>
+    <p:sldLayoutId id="2147483778" r:id="rId10"/>
+    <p:sldLayoutId id="2147483779" r:id="rId11"/>
+    <p:sldLayoutId id="2147483780" r:id="rId12"/>
+    <p:sldLayoutId id="2147483781" r:id="rId13"/>
+    <p:sldLayoutId id="2147483782" r:id="rId14"/>
+    <p:sldLayoutId id="2147483783" r:id="rId15"/>
+    <p:sldLayoutId id="2147483784" r:id="rId16"/>
+    <p:sldLayoutId id="2147483785" r:id="rId17"/>
   </p:sldLayoutIdLst>
   <p:hf sldNum="0" hdr="0" ftr="0" dt="0"/>
   <p:txStyles>
@@ -6146,8 +6147,20 @@
                   <a:schemeClr val="tx1"/>
                 </a:solidFill>
               </a:rPr>
-              <a:t>House Prices Prediction Advanced Regression Analysis</a:t>
-            </a:r>
+              <a:t>Ghost Job Analysis</a:t>
+            </a:r>
+            <a:br>
+              <a:rPr lang="en-US" sz="6000" b="1" dirty="0">
+                <a:solidFill>
+                  <a:schemeClr val="tx1"/>
+                </a:solidFill>
+              </a:rPr>
+            </a:br>
+            <a:endParaRPr lang="en-US" sz="6000" b="1" dirty="0">
+              <a:solidFill>
+                <a:schemeClr val="tx1"/>
+              </a:solidFill>
+            </a:endParaRPr>
           </a:p>
         </p:txBody>
       </p:sp>
@@ -6195,7 +6208,7 @@
                   <a:schemeClr val="tx1"/>
                 </a:solidFill>
               </a:rPr>
-              <a:t>Date: 10/10/2024</a:t>
+              <a:t>Date: 10/13/2024</a:t>
             </a:r>
           </a:p>
         </p:txBody>
@@ -6276,8 +6289,8 @@
         </p:nvSpPr>
         <p:spPr>
           <a:xfrm>
-            <a:off x="646111" y="1640541"/>
-            <a:ext cx="8946541" cy="4195481"/>
+            <a:off x="646111" y="1416425"/>
+            <a:ext cx="8946541" cy="4419598"/>
           </a:xfrm>
         </p:spPr>
         <p:txBody>
@@ -6290,9 +6303,54 @@
               <a:buNone/>
             </a:pPr>
             <a:r>
-              <a:rPr lang="en-US" sz="3600" b="1" dirty="0"/>
-              <a:t>Predicting the sale price of a house is a complex task influenced by numerous factors. While traditional real estate metrics like the number of bedrooms and bathrooms play a role, this competition delves deeper into the intricate details that truly impact pricing</a:t>
-            </a:r>
+              <a:rPr lang="en-US" sz="1800" b="1" dirty="0"/>
+              <a:t>This dataset contains 18K job descriptions out of which about 800 are fake. The data consists of both textual information and meta-information about the jobs. like:  </a:t>
+            </a:r>
+            <a:r>
+              <a:rPr lang="en-US" sz="1800" b="1" i="1" dirty="0"/>
+              <a:t>title, description, salary range, location, company name, logo, etc.</a:t>
+            </a:r>
+          </a:p>
+          <a:p>
+            <a:pPr fontAlgn="base"/>
+            <a:r>
+              <a:rPr lang="en-US" dirty="0"/>
+              <a:t>The dataset is very valuable as it can be used to answer the following questions:</a:t>
+            </a:r>
+          </a:p>
+          <a:p>
+            <a:pPr fontAlgn="base"/>
+            <a:r>
+              <a:rPr lang="en-US" dirty="0"/>
+              <a:t>Create a classification model that uses text data features and meta-features and predict which job description are fraudulent or real.</a:t>
+            </a:r>
+          </a:p>
+          <a:p>
+            <a:pPr fontAlgn="base"/>
+            <a:r>
+              <a:rPr lang="en-US" dirty="0"/>
+              <a:t>Identify key features (words, entities, phrases) of job descriptions which are fraudulent in nature.</a:t>
+            </a:r>
+          </a:p>
+          <a:p>
+            <a:pPr fontAlgn="base"/>
+            <a:r>
+              <a:rPr lang="en-US" dirty="0"/>
+              <a:t>Run a contextual embedding model to identify the most similar job descriptions.</a:t>
+            </a:r>
+          </a:p>
+          <a:p>
+            <a:pPr fontAlgn="base"/>
+            <a:r>
+              <a:rPr lang="en-US" dirty="0"/>
+              <a:t>Perform Exploratory Data Analysis on the dataset to identify interesting insights from this dataset.</a:t>
+            </a:r>
+          </a:p>
+          <a:p>
+            <a:pPr marL="0" indent="0">
+              <a:buNone/>
+            </a:pPr>
+            <a:endParaRPr lang="en-US" sz="1800" dirty="0"/>
           </a:p>
         </p:txBody>
       </p:sp>
@@ -6354,7 +6412,7 @@
           <a:p>
             <a:r>
               <a:rPr lang="en-US" b="1" u="sng" dirty="0"/>
-              <a:t>Purpose of Dissecting Model Visual</a:t>
+              <a:t>Purpose</a:t>
             </a:r>
           </a:p>
         </p:txBody>
@@ -6377,8 +6435,8 @@
         </p:nvSpPr>
         <p:spPr>
           <a:xfrm>
-            <a:off x="717829" y="1515036"/>
-            <a:ext cx="10003959" cy="4625788"/>
+            <a:off x="717829" y="1222513"/>
+            <a:ext cx="10003959" cy="4918311"/>
           </a:xfrm>
         </p:spPr>
         <p:txBody>
@@ -6391,8 +6449,66 @@
               <a:buNone/>
             </a:pPr>
             <a:r>
+              <a:rPr lang="en-US" sz="3200" dirty="0"/>
+              <a:t>Real or Fake! </a:t>
+            </a:r>
+            <a:r>
+              <a:rPr lang="en-US" sz="3200" b="1" dirty="0"/>
+              <a:t>Predicting</a:t>
+            </a:r>
+            <a:r>
+              <a:rPr lang="en-US" sz="3200" dirty="0"/>
+              <a:t> Fake Job Descriptions</a:t>
+            </a:r>
+          </a:p>
+          <a:p>
+            <a:pPr marL="0" indent="0">
+              <a:buNone/>
+            </a:pPr>
+            <a:endParaRPr lang="en-US" sz="3200" dirty="0"/>
+          </a:p>
+          <a:p>
+            <a:pPr marL="0" indent="0">
+              <a:buNone/>
+            </a:pPr>
+            <a:r>
               <a:rPr lang="en-US" sz="3600" b="1" dirty="0"/>
-              <a:t>My objective is to develop a predictive model capable of accurately estimating the sale price for each house in the test set. By understanding the intricate interplay between these variables, we aim to create a powerful tool for real estate professionals and homebuyers alike.</a:t>
+              <a:t>Problem</a:t>
+            </a:r>
+            <a:r>
+              <a:rPr lang="en-US" sz="3600" dirty="0"/>
+              <a:t> </a:t>
+            </a:r>
+            <a:r>
+              <a:rPr lang="en-US" sz="3200" b="1" dirty="0"/>
+              <a:t>Statement</a:t>
+            </a:r>
+            <a:r>
+              <a:rPr lang="en-US" sz="3200" dirty="0"/>
+              <a:t>: The rapid increase in numbers of fake job postings online poses a significant threat to job seekers.</a:t>
+            </a:r>
+          </a:p>
+          <a:p>
+            <a:pPr marL="0" indent="0">
+              <a:buNone/>
+            </a:pPr>
+            <a:endParaRPr lang="en-US" sz="3200" dirty="0"/>
+          </a:p>
+          <a:p>
+            <a:pPr marL="0" indent="0">
+              <a:buNone/>
+            </a:pPr>
+            <a:r>
+              <a:rPr lang="en-US" sz="3600" b="1" dirty="0"/>
+              <a:t>Objective</a:t>
+            </a:r>
+            <a:r>
+              <a:rPr lang="en-US" sz="3600" dirty="0"/>
+              <a:t>: </a:t>
+            </a:r>
+            <a:r>
+              <a:rPr lang="en-US" sz="3200" dirty="0"/>
+              <a:t>Develop a model to accurately identify fraudulent job descriptions.</a:t>
             </a:r>
           </a:p>
         </p:txBody>
@@ -6450,15 +6566,15 @@
           <a:p>
             <a:r>
               <a:rPr lang="en-US" b="1" dirty="0"/>
-              <a:t>The Approach: </a:t>
-            </a:r>
-            <a:r>
-              <a:rPr lang="en-US" sz="2000" b="1" dirty="0"/>
-              <a:t>This presentation will outline our methodology for tackling this challenging problem. We will explore various machine learning techniques, feature engineering strategies, and model evaluation metrics to identify the most effective approach</a:t>
+              <a:t>Feature Engineering</a:t>
             </a:r>
             <a:br>
-              <a:rPr lang="en-US" sz="2000" b="1" dirty="0"/>
+              <a:rPr lang="en-US" b="1" dirty="0"/>
             </a:br>
+            <a:r>
+              <a:rPr lang="en-US" b="1" dirty="0"/>
+              <a:t> </a:t>
+            </a:r>
             <a:endParaRPr lang="en-US" sz="2000" b="1" u="sng" dirty="0"/>
           </a:p>
         </p:txBody>
@@ -6481,47 +6597,54 @@
         </p:nvSpPr>
         <p:spPr>
           <a:xfrm>
-            <a:off x="645130" y="2321860"/>
+            <a:off x="646111" y="1556547"/>
             <a:ext cx="8946541" cy="4204446"/>
           </a:xfrm>
         </p:spPr>
         <p:txBody>
           <a:bodyPr>
-            <a:normAutofit/>
+            <a:normAutofit lnSpcReduction="10000"/>
           </a:bodyPr>
           <a:lstStyle/>
           <a:p>
             <a:r>
               <a:rPr lang="en-US" sz="2400" b="1" dirty="0"/>
-              <a:t>Key Questions:</a:t>
+              <a:t>In this step, </a:t>
+            </a:r>
+            <a:r>
+              <a:rPr lang="en-US" sz="2400" dirty="0"/>
+              <a:t>Identify all the NULL values present in different columns, and replace with appropriate one.</a:t>
             </a:r>
           </a:p>
           <a:p>
             <a:r>
               <a:rPr lang="en-US" sz="2400" b="1" dirty="0"/>
-              <a:t>Which features are most influential in determining house prices?</a:t>
+              <a:t>Then used </a:t>
+            </a:r>
+            <a:r>
+              <a:rPr lang="en-US" sz="2400" dirty="0"/>
+              <a:t>Text preprocessing function to convert text description into Lowercases, Removes numbers, Removes extra spaces, Removes punctuation and special symbols.</a:t>
             </a:r>
           </a:p>
           <a:p>
             <a:r>
               <a:rPr lang="en-US" sz="2400" b="1" dirty="0"/>
-              <a:t>Can we identify non-linear relationships between variables?</a:t>
+              <a:t>After this, </a:t>
+            </a:r>
+            <a:r>
+              <a:rPr lang="en-US" sz="2400" dirty="0"/>
+              <a:t>applied this pre-process method on whole dataset.</a:t>
             </a:r>
           </a:p>
           <a:p>
             <a:r>
               <a:rPr lang="en-US" sz="2400" b="1" dirty="0"/>
-              <a:t>How can we handle missing data and outliers to ensure model accuracy?</a:t>
-            </a:r>
-          </a:p>
-          <a:p>
-            <a:r>
-              <a:rPr lang="en-US" sz="2400" b="1" dirty="0"/>
-              <a:t>What evaluation metrics will we use to assess our model's performance?</a:t>
-            </a:r>
-          </a:p>
-          <a:p>
-            <a:endParaRPr lang="en-US" sz="2400" b="1" dirty="0"/>
+              <a:t>Then</a:t>
+            </a:r>
+            <a:r>
+              <a:rPr lang="en-US" sz="2400" dirty="0"/>
+              <a:t> used different method to find out the repeating word, and other measure to identify key terms between fake / original job.</a:t>
+            </a:r>
           </a:p>
         </p:txBody>
       </p:sp>
@@ -6577,9 +6700,10 @@
           <a:lstStyle/>
           <a:p>
             <a:r>
-              <a:rPr lang="en-US" b="1" u="sng" dirty="0"/>
-              <a:t>Benefits of Using Dissecting data visual</a:t>
-            </a:r>
+              <a:rPr lang="en-US" b="1" dirty="0"/>
+              <a:t>Model Selection and Training</a:t>
+            </a:r>
+            <a:endParaRPr lang="en-US" b="1" u="sng" dirty="0"/>
           </a:p>
         </p:txBody>
       </p:sp>
@@ -6607,46 +6731,69 @@
           <a:lstStyle/>
           <a:p>
             <a:r>
-              <a:rPr lang="en-US" sz="2800" b="1" dirty="0"/>
-              <a:t>Provide </a:t>
-            </a:r>
-            <a:r>
-              <a:rPr lang="en-US" sz="2800" dirty="0"/>
-              <a:t>more </a:t>
-            </a:r>
-            <a:r>
-              <a:rPr lang="en-US" sz="2800" b="1" dirty="0"/>
-              <a:t>control</a:t>
-            </a:r>
-            <a:r>
-              <a:rPr lang="en-US" sz="2800" dirty="0"/>
-              <a:t> over data to draw more attention to detail visualization.</a:t>
-            </a:r>
-          </a:p>
-          <a:p>
-            <a:r>
-              <a:rPr lang="en-US" sz="2800" b="1" dirty="0"/>
-              <a:t>Encourages Exploration</a:t>
-            </a:r>
-            <a:r>
-              <a:rPr lang="en-US" sz="2800" dirty="0"/>
-              <a:t>: We can easily explore various factors influencing a metric, uncovering insights they might have missed otherwise.</a:t>
-            </a:r>
-          </a:p>
-          <a:p>
-            <a:r>
-              <a:rPr lang="en-US" sz="2800" b="1" dirty="0"/>
-              <a:t>Facilitates Communication</a:t>
-            </a:r>
-            <a:r>
-              <a:rPr lang="en-US" sz="2800" dirty="0"/>
-              <a:t>: Dissecting visual can help communicate findings to stakeholders, allowing for informed decision-making.</a:t>
-            </a:r>
-          </a:p>
-          <a:p>
-            <a:pPr marL="0" indent="0">
-              <a:buNone/>
-            </a:pPr>
+              <a:rPr lang="en-US" sz="2400" dirty="0"/>
+              <a:t>I have used three different model to identify the trend.</a:t>
+            </a:r>
+          </a:p>
+          <a:p>
+            <a:r>
+              <a:rPr lang="en-US" sz="2400" dirty="0"/>
+              <a:t>TF-IDF, Confusion matrix, Multinomial Naive Bayes analysis,</a:t>
+            </a:r>
+          </a:p>
+          <a:p>
+            <a:r>
+              <a:rPr lang="en-US" sz="2400" dirty="0"/>
+              <a:t>Correlation, ROC Curve</a:t>
+            </a:r>
+          </a:p>
+          <a:p>
+            <a:r>
+              <a:rPr lang="fr-FR" sz="2400" dirty="0"/>
+              <a:t>Confusion Matrix: </a:t>
+            </a:r>
+            <a:r>
+              <a:rPr lang="fr-FR" sz="2400" b="1" dirty="0" err="1"/>
+              <a:t>True</a:t>
+            </a:r>
+            <a:r>
+              <a:rPr lang="fr-FR" sz="2400" b="1" dirty="0"/>
+              <a:t> Positive: 3395 0 </a:t>
+            </a:r>
+            <a:r>
+              <a:rPr lang="fr-FR" sz="2400" b="1" dirty="0" err="1"/>
+              <a:t>True</a:t>
+            </a:r>
+            <a:r>
+              <a:rPr lang="fr-FR" sz="2400" b="1" dirty="0"/>
+              <a:t> </a:t>
+            </a:r>
+            <a:r>
+              <a:rPr lang="fr-FR" sz="2400" b="1" dirty="0" err="1"/>
+              <a:t>Negative</a:t>
+            </a:r>
+            <a:r>
+              <a:rPr lang="fr-FR" sz="2400" b="1" dirty="0"/>
+              <a:t>: 123 58</a:t>
+            </a:r>
+          </a:p>
+          <a:p>
+            <a:r>
+              <a:rPr lang="fr-FR" sz="2400" dirty="0"/>
+              <a:t>ROC AUC Score: </a:t>
+            </a:r>
+            <a:r>
+              <a:rPr lang="fr-FR" sz="2400" b="1" dirty="0"/>
+              <a:t>0.9394576033979121</a:t>
+            </a:r>
+          </a:p>
+          <a:p>
+            <a:r>
+              <a:rPr lang="en-US" sz="2400" dirty="0"/>
+              <a:t>The model shows a good balance between detecting true positives and minimizing false positives.</a:t>
+            </a:r>
+          </a:p>
+          <a:p>
             <a:endParaRPr lang="en-US" sz="2400" dirty="0"/>
           </a:p>
         </p:txBody>
@@ -6686,7 +6833,7 @@
           <p:cNvPr id="2" name="Title 1">
             <a:extLst>
               <a:ext uri="{FF2B5EF4-FFF2-40B4-BE49-F238E27FC236}">
-                <a16:creationId xmlns:a16="http://schemas.microsoft.com/office/drawing/2014/main" id="{FC626AAF-162E-4B87-8683-F66FF6A73E80}"/>
+                <a16:creationId xmlns:a16="http://schemas.microsoft.com/office/drawing/2014/main" id="{29CA9107-AD5F-46FF-B1B5-727B99599916}"/>
               </a:ext>
             </a:extLst>
           </p:cNvPr>
@@ -6704,7 +6851,7 @@
           <a:p>
             <a:r>
               <a:rPr lang="en-US" b="1" u="sng" dirty="0"/>
-              <a:t>Best Practices</a:t>
+              <a:t>Model Evaluation</a:t>
             </a:r>
           </a:p>
         </p:txBody>
@@ -6714,7 +6861,7 @@
           <p:cNvPr id="3" name="Content Placeholder 2">
             <a:extLst>
               <a:ext uri="{FF2B5EF4-FFF2-40B4-BE49-F238E27FC236}">
-                <a16:creationId xmlns:a16="http://schemas.microsoft.com/office/drawing/2014/main" id="{EE286651-E768-4C30-B3E7-6888A80ADB19}"/>
+                <a16:creationId xmlns:a16="http://schemas.microsoft.com/office/drawing/2014/main" id="{050E725A-19B7-441F-A15D-7D56BBDCE16D}"/>
               </a:ext>
             </a:extLst>
           </p:cNvPr>
@@ -6725,62 +6872,62 @@
             <p:ph idx="1"/>
           </p:nvPr>
         </p:nvSpPr>
-        <p:spPr>
-          <a:xfrm>
-            <a:off x="646111" y="1609165"/>
-            <a:ext cx="8946541" cy="4195481"/>
-          </a:xfrm>
-        </p:spPr>
-        <p:txBody>
-          <a:bodyPr>
-            <a:noAutofit/>
-          </a:bodyPr>
-          <a:lstStyle/>
-          <a:p>
-            <a:r>
-              <a:rPr lang="en-US" sz="2800" dirty="0"/>
-              <a:t>To make the most out of decomposition trees, consider these best practices:</a:t>
-            </a:r>
-          </a:p>
-          <a:p>
-            <a:r>
-              <a:rPr lang="en-US" sz="2800" b="1" dirty="0"/>
-              <a:t>Keep it Simple</a:t>
-            </a:r>
-            <a:r>
-              <a:rPr lang="en-US" sz="2800" dirty="0"/>
-              <a:t>: Avoid data inconsistency with too many branches; clarity is key.</a:t>
-            </a:r>
-          </a:p>
-          <a:p>
-            <a:r>
-              <a:rPr lang="en-US" sz="2800" b="1" dirty="0"/>
-              <a:t>Ensure Clarity</a:t>
-            </a:r>
-            <a:r>
-              <a:rPr lang="en-US" sz="2800" dirty="0"/>
-              <a:t>: Create multiple model, training, testing clear labels and consistent scales to avoid confusion.</a:t>
-            </a:r>
-          </a:p>
-          <a:p>
-            <a:r>
-              <a:rPr lang="en-US" sz="2800" b="1" dirty="0"/>
-              <a:t>Focus on Actionable Insights</a:t>
-            </a:r>
-            <a:r>
-              <a:rPr lang="en-US" sz="2800" dirty="0"/>
-              <a:t>: Aim to highlight key findings that can lead to actionable decisions</a:t>
-            </a:r>
-          </a:p>
-          <a:p>
-            <a:endParaRPr lang="en-US" sz="2800" dirty="0"/>
+        <p:spPr/>
+        <p:txBody>
+          <a:bodyPr/>
+          <a:lstStyle/>
+          <a:p>
+            <a:r>
+              <a:rPr lang="en-US" b="1" dirty="0"/>
+              <a:t>Top Words in Fraudulent Job Postings</a:t>
+            </a:r>
+            <a:endParaRPr lang="en-US" dirty="0"/>
+          </a:p>
+          <a:p>
+            <a:r>
+              <a:rPr lang="en-US" dirty="0"/>
+              <a:t>Work: The most frequent word, appearing over 1,600 times.</a:t>
+            </a:r>
+          </a:p>
+          <a:p>
+            <a:r>
+              <a:rPr lang="en-US" dirty="0"/>
+              <a:t>Experience: Commonly mentioned, indicating an emphasis on prior job experience.</a:t>
+            </a:r>
+          </a:p>
+          <a:p>
+            <a:r>
+              <a:rPr lang="en-US" dirty="0"/>
+              <a:t>Skills: Highlighting the necessity of particular abilities.</a:t>
+            </a:r>
+          </a:p>
+          <a:p>
+            <a:r>
+              <a:rPr lang="en-US" dirty="0"/>
+              <a:t>Amp: Likely due to formatting issues in the dataset.</a:t>
+            </a:r>
+          </a:p>
+          <a:p>
+            <a:r>
+              <a:rPr lang="en-US" dirty="0"/>
+              <a:t>Team: Stressing the importance of team dynamics.</a:t>
+            </a:r>
+          </a:p>
+          <a:p>
+            <a:r>
+              <a:rPr lang="en-US" dirty="0"/>
+              <a:t>Other notable words include company, management, business, service, customer, position, time, engineering, data, project, services, new, ability, years, and solutions.</a:t>
+            </a:r>
+          </a:p>
+          <a:p>
+            <a:endParaRPr lang="en-US" dirty="0"/>
           </a:p>
         </p:txBody>
       </p:sp>
     </p:spTree>
     <p:extLst>
       <p:ext uri="{BB962C8B-B14F-4D97-AF65-F5344CB8AC3E}">
-        <p14:creationId xmlns:p14="http://schemas.microsoft.com/office/powerpoint/2010/main" val="1419372919"/>
+        <p14:creationId xmlns:p14="http://schemas.microsoft.com/office/powerpoint/2010/main" val="4239611304"/>
       </p:ext>
     </p:extLst>
   </p:cSld>
@@ -6812,6 +6959,143 @@
           <p:cNvPr id="2" name="Title 1">
             <a:extLst>
               <a:ext uri="{FF2B5EF4-FFF2-40B4-BE49-F238E27FC236}">
+                <a16:creationId xmlns:a16="http://schemas.microsoft.com/office/drawing/2014/main" id="{FC626AAF-162E-4B87-8683-F66FF6A73E80}"/>
+              </a:ext>
+            </a:extLst>
+          </p:cNvPr>
+          <p:cNvSpPr>
+            <a:spLocks noGrp="1"/>
+          </p:cNvSpPr>
+          <p:nvPr>
+            <p:ph type="title"/>
+          </p:nvPr>
+        </p:nvSpPr>
+        <p:spPr/>
+        <p:txBody>
+          <a:bodyPr/>
+          <a:lstStyle/>
+          <a:p>
+            <a:r>
+              <a:rPr lang="en-US" b="1" u="sng" dirty="0"/>
+              <a:t>Model Evaluation</a:t>
+            </a:r>
+          </a:p>
+        </p:txBody>
+      </p:sp>
+      <p:sp>
+        <p:nvSpPr>
+          <p:cNvPr id="3" name="Content Placeholder 2">
+            <a:extLst>
+              <a:ext uri="{FF2B5EF4-FFF2-40B4-BE49-F238E27FC236}">
+                <a16:creationId xmlns:a16="http://schemas.microsoft.com/office/drawing/2014/main" id="{EE286651-E768-4C30-B3E7-6888A80ADB19}"/>
+              </a:ext>
+            </a:extLst>
+          </p:cNvPr>
+          <p:cNvSpPr>
+            <a:spLocks noGrp="1"/>
+          </p:cNvSpPr>
+          <p:nvPr>
+            <p:ph idx="1"/>
+          </p:nvPr>
+        </p:nvSpPr>
+        <p:spPr>
+          <a:xfrm>
+            <a:off x="646111" y="1609165"/>
+            <a:ext cx="8946541" cy="4195481"/>
+          </a:xfrm>
+        </p:spPr>
+        <p:txBody>
+          <a:bodyPr>
+            <a:noAutofit/>
+          </a:bodyPr>
+          <a:lstStyle/>
+          <a:p>
+            <a:r>
+              <a:rPr lang="en-US" b="1"/>
+              <a:t> </a:t>
+            </a:r>
+            <a:r>
+              <a:rPr lang="en-US" b="1" dirty="0"/>
+              <a:t>Top Words in Non-Fraudulent Job Postings</a:t>
+            </a:r>
+            <a:endParaRPr lang="en-US" dirty="0"/>
+          </a:p>
+          <a:p>
+            <a:r>
+              <a:rPr lang="en-US" dirty="0"/>
+              <a:t>Work: Also the most frequent word, appearing over 35,000 times.</a:t>
+            </a:r>
+          </a:p>
+          <a:p>
+            <a:r>
+              <a:rPr lang="en-US" dirty="0"/>
+              <a:t>Experience: Similarly emphasized, appearing frequently.</a:t>
+            </a:r>
+          </a:p>
+          <a:p>
+            <a:r>
+              <a:rPr lang="en-US" dirty="0"/>
+              <a:t>Team: Suggesting a focus on collaborative work environments.</a:t>
+            </a:r>
+          </a:p>
+          <a:p>
+            <a:r>
+              <a:rPr lang="en-US" dirty="0"/>
+              <a:t>Business: Indicative of a professional and corporate setting.</a:t>
+            </a:r>
+          </a:p>
+          <a:p>
+            <a:r>
+              <a:rPr lang="en-US" dirty="0"/>
+              <a:t>Company: Mentioned frequently, likely referring to the hiring organization.</a:t>
+            </a:r>
+          </a:p>
+          <a:p>
+            <a:r>
+              <a:rPr lang="en-US" dirty="0"/>
+              <a:t>Other significant words include new, customer, skills, sales, management, development, working, services, amp, service, years, people, looking, marketing, and us.</a:t>
+            </a:r>
+          </a:p>
+          <a:p>
+            <a:endParaRPr lang="en-US" sz="2800" b="1" dirty="0"/>
+          </a:p>
+        </p:txBody>
+      </p:sp>
+    </p:spTree>
+    <p:extLst>
+      <p:ext uri="{BB962C8B-B14F-4D97-AF65-F5344CB8AC3E}">
+        <p14:creationId xmlns:p14="http://schemas.microsoft.com/office/powerpoint/2010/main" val="1419372919"/>
+      </p:ext>
+    </p:extLst>
+  </p:cSld>
+  <p:clrMapOvr>
+    <a:masterClrMapping/>
+  </p:clrMapOvr>
+</p:sld>
+</file>
+
+<file path=ppt/slides/slide8.xml><?xml version="1.0" encoding="utf-8"?>
+<p:sld xmlns:a="http://schemas.openxmlformats.org/drawingml/2006/main" xmlns:r="http://schemas.openxmlformats.org/officeDocument/2006/relationships" xmlns:p="http://schemas.openxmlformats.org/presentationml/2006/main">
+  <p:cSld>
+    <p:spTree>
+      <p:nvGrpSpPr>
+        <p:cNvPr id="1" name=""/>
+        <p:cNvGrpSpPr/>
+        <p:nvPr/>
+      </p:nvGrpSpPr>
+      <p:grpSpPr>
+        <a:xfrm>
+          <a:off x="0" y="0"/>
+          <a:ext cx="0" cy="0"/>
+          <a:chOff x="0" y="0"/>
+          <a:chExt cx="0" cy="0"/>
+        </a:xfrm>
+      </p:grpSpPr>
+      <p:sp>
+        <p:nvSpPr>
+          <p:cNvPr id="2" name="Title 1">
+            <a:extLst>
+              <a:ext uri="{FF2B5EF4-FFF2-40B4-BE49-F238E27FC236}">
                 <a16:creationId xmlns:a16="http://schemas.microsoft.com/office/drawing/2014/main" id="{F673CD38-F4E9-4061-AB9D-35CEB0BE33F6}"/>
               </a:ext>
             </a:extLst>
@@ -6854,19 +7138,41 @@
         <p:spPr/>
         <p:txBody>
           <a:bodyPr>
-            <a:normAutofit/>
+            <a:normAutofit fontScale="92500"/>
           </a:bodyPr>
           <a:lstStyle/>
           <a:p>
             <a:r>
+              <a:rPr lang="en-US" sz="2800" b="1" dirty="0"/>
+              <a:t>Both</a:t>
+            </a:r>
+            <a:r>
               <a:rPr lang="en-US" sz="2800" dirty="0"/>
-              <a:t>In conclusion, After using various technique and model to predict Sales Price of house with minimum error margin, And I have build best model that only shows 0.0012 % error margin.</a:t>
-            </a:r>
-          </a:p>
-          <a:p>
+              <a:t> fraudulent and non-fraudulent job postings frequently use terms like work, experience, team, and skills. </a:t>
+            </a:r>
+          </a:p>
+          <a:p>
+            <a:r>
+              <a:rPr lang="en-US" sz="2800" b="1" dirty="0"/>
+              <a:t>However</a:t>
+            </a:r>
             <a:r>
               <a:rPr lang="en-US" sz="2800" dirty="0"/>
-              <a:t>The majority of sale prices are between 100,000 and 200,000 $. The distribution is right-skewed, meaning that there are more sale prices at the lower end of the range than at the higher</a:t>
+              <a:t>, non-fraudulent postings have a higher emphasis on business-related terms like company, business, customer, sales, and management.</a:t>
+            </a:r>
+          </a:p>
+          <a:p>
+            <a:r>
+              <a:rPr lang="en-US" sz="2800" dirty="0"/>
+              <a:t> </a:t>
+            </a:r>
+            <a:r>
+              <a:rPr lang="en-US" sz="2800" b="1" dirty="0"/>
+              <a:t>Fraudulent</a:t>
+            </a:r>
+            <a:r>
+              <a:rPr lang="en-US" sz="2800" dirty="0"/>
+              <a:t> postings, on the other hand, show a diverse range of terms with a slight focus on management, service, position, and engineering.</a:t>
             </a:r>
           </a:p>
           <a:p>

</xml_diff>